<commit_message>
fix type and img
</commit_message>
<xml_diff>
--- a/invoke-kudu-rest-api/images/figures.pptx
+++ b/invoke-kudu-rest-api/images/figures.pptx
@@ -7,9 +7,10 @@
   <p:sldIdLst>
     <p:sldId id="256" r:id="rId2"/>
     <p:sldId id="258" r:id="rId3"/>
-    <p:sldId id="259" r:id="rId4"/>
-    <p:sldId id="260" r:id="rId5"/>
-    <p:sldId id="261" r:id="rId6"/>
+    <p:sldId id="262" r:id="rId4"/>
+    <p:sldId id="259" r:id="rId5"/>
+    <p:sldId id="260" r:id="rId6"/>
+    <p:sldId id="261" r:id="rId7"/>
   </p:sldIdLst>
   <p:sldSz cx="12192000" cy="6858000"/>
   <p:notesSz cx="6858000" cy="9144000"/>
@@ -263,7 +264,7 @@
           <a:p>
             <a:fld id="{3529557E-4AFE-4BD1-BBF5-F82B436F9863}" type="datetimeFigureOut">
               <a:rPr kumimoji="1" lang="ja-JP" altLang="en-US" smtClean="0"/>
-              <a:t>2022/9/30</a:t>
+              <a:t>2022/10/1</a:t>
             </a:fld>
             <a:endParaRPr kumimoji="1" lang="ja-JP" altLang="en-US"/>
           </a:p>
@@ -493,7 +494,7 @@
           <a:p>
             <a:fld id="{3529557E-4AFE-4BD1-BBF5-F82B436F9863}" type="datetimeFigureOut">
               <a:rPr kumimoji="1" lang="ja-JP" altLang="en-US" smtClean="0"/>
-              <a:t>2022/9/30</a:t>
+              <a:t>2022/10/1</a:t>
             </a:fld>
             <a:endParaRPr kumimoji="1" lang="ja-JP" altLang="en-US"/>
           </a:p>
@@ -733,7 +734,7 @@
           <a:p>
             <a:fld id="{3529557E-4AFE-4BD1-BBF5-F82B436F9863}" type="datetimeFigureOut">
               <a:rPr kumimoji="1" lang="ja-JP" altLang="en-US" smtClean="0"/>
-              <a:t>2022/9/30</a:t>
+              <a:t>2022/10/1</a:t>
             </a:fld>
             <a:endParaRPr kumimoji="1" lang="ja-JP" altLang="en-US"/>
           </a:p>
@@ -963,7 +964,7 @@
           <a:p>
             <a:fld id="{3529557E-4AFE-4BD1-BBF5-F82B436F9863}" type="datetimeFigureOut">
               <a:rPr kumimoji="1" lang="ja-JP" altLang="en-US" smtClean="0"/>
-              <a:t>2022/9/30</a:t>
+              <a:t>2022/10/1</a:t>
             </a:fld>
             <a:endParaRPr kumimoji="1" lang="ja-JP" altLang="en-US"/>
           </a:p>
@@ -1238,7 +1239,7 @@
           <a:p>
             <a:fld id="{3529557E-4AFE-4BD1-BBF5-F82B436F9863}" type="datetimeFigureOut">
               <a:rPr kumimoji="1" lang="ja-JP" altLang="en-US" smtClean="0"/>
-              <a:t>2022/9/30</a:t>
+              <a:t>2022/10/1</a:t>
             </a:fld>
             <a:endParaRPr kumimoji="1" lang="ja-JP" altLang="en-US"/>
           </a:p>
@@ -1567,7 +1568,7 @@
           <a:p>
             <a:fld id="{3529557E-4AFE-4BD1-BBF5-F82B436F9863}" type="datetimeFigureOut">
               <a:rPr kumimoji="1" lang="ja-JP" altLang="en-US" smtClean="0"/>
-              <a:t>2022/9/30</a:t>
+              <a:t>2022/10/1</a:t>
             </a:fld>
             <a:endParaRPr kumimoji="1" lang="ja-JP" altLang="en-US"/>
           </a:p>
@@ -2043,7 +2044,7 @@
           <a:p>
             <a:fld id="{3529557E-4AFE-4BD1-BBF5-F82B436F9863}" type="datetimeFigureOut">
               <a:rPr kumimoji="1" lang="ja-JP" altLang="en-US" smtClean="0"/>
-              <a:t>2022/9/30</a:t>
+              <a:t>2022/10/1</a:t>
             </a:fld>
             <a:endParaRPr kumimoji="1" lang="ja-JP" altLang="en-US"/>
           </a:p>
@@ -2184,7 +2185,7 @@
           <a:p>
             <a:fld id="{3529557E-4AFE-4BD1-BBF5-F82B436F9863}" type="datetimeFigureOut">
               <a:rPr kumimoji="1" lang="ja-JP" altLang="en-US" smtClean="0"/>
-              <a:t>2022/9/30</a:t>
+              <a:t>2022/10/1</a:t>
             </a:fld>
             <a:endParaRPr kumimoji="1" lang="ja-JP" altLang="en-US"/>
           </a:p>
@@ -2297,7 +2298,7 @@
           <a:p>
             <a:fld id="{3529557E-4AFE-4BD1-BBF5-F82B436F9863}" type="datetimeFigureOut">
               <a:rPr kumimoji="1" lang="ja-JP" altLang="en-US" smtClean="0"/>
-              <a:t>2022/9/30</a:t>
+              <a:t>2022/10/1</a:t>
             </a:fld>
             <a:endParaRPr kumimoji="1" lang="ja-JP" altLang="en-US"/>
           </a:p>
@@ -2640,7 +2641,7 @@
           <a:p>
             <a:fld id="{3529557E-4AFE-4BD1-BBF5-F82B436F9863}" type="datetimeFigureOut">
               <a:rPr kumimoji="1" lang="ja-JP" altLang="en-US" smtClean="0"/>
-              <a:t>2022/9/30</a:t>
+              <a:t>2022/10/1</a:t>
             </a:fld>
             <a:endParaRPr kumimoji="1" lang="ja-JP" altLang="en-US"/>
           </a:p>
@@ -2928,7 +2929,7 @@
           <a:p>
             <a:fld id="{3529557E-4AFE-4BD1-BBF5-F82B436F9863}" type="datetimeFigureOut">
               <a:rPr kumimoji="1" lang="ja-JP" altLang="en-US" smtClean="0"/>
-              <a:t>2022/9/30</a:t>
+              <a:t>2022/10/1</a:t>
             </a:fld>
             <a:endParaRPr kumimoji="1" lang="ja-JP" altLang="en-US"/>
           </a:p>
@@ -3201,7 +3202,7 @@
           <a:p>
             <a:fld id="{3529557E-4AFE-4BD1-BBF5-F82B436F9863}" type="datetimeFigureOut">
               <a:rPr kumimoji="1" lang="ja-JP" altLang="en-US" smtClean="0"/>
-              <a:t>2022/9/30</a:t>
+              <a:t>2022/10/1</a:t>
             </a:fld>
             <a:endParaRPr kumimoji="1" lang="ja-JP" altLang="en-US"/>
           </a:p>
@@ -5616,42 +5617,6 @@
       </p:sp>
       <p:pic>
         <p:nvPicPr>
-          <p:cNvPr id="31" name="図 30" descr="アイコン&#10;&#10;自動的に生成された説明">
-            <a:extLst>
-              <a:ext uri="{FF2B5EF4-FFF2-40B4-BE49-F238E27FC236}">
-                <a16:creationId xmlns:a16="http://schemas.microsoft.com/office/drawing/2014/main" id="{E95C1ACB-CF36-BC20-2559-23738E20622C}"/>
-              </a:ext>
-            </a:extLst>
-          </p:cNvPr>
-          <p:cNvPicPr>
-            <a:picLocks noChangeAspect="1"/>
-          </p:cNvPicPr>
-          <p:nvPr/>
-        </p:nvPicPr>
-        <p:blipFill>
-          <a:blip r:embed="rId14">
-            <a:extLst>
-              <a:ext uri="{28A0092B-C50C-407E-A947-70E740481C1C}">
-                <a14:useLocalDpi xmlns:a14="http://schemas.microsoft.com/office/drawing/2010/main" val="0"/>
-              </a:ext>
-            </a:extLst>
-          </a:blip>
-          <a:stretch>
-            <a:fillRect/>
-          </a:stretch>
-        </p:blipFill>
-        <p:spPr>
-          <a:xfrm>
-            <a:off x="10207698" y="649848"/>
-            <a:ext cx="514286" cy="581538"/>
-          </a:xfrm>
-          <a:prstGeom prst="rect">
-            <a:avLst/>
-          </a:prstGeom>
-        </p:spPr>
-      </p:pic>
-      <p:pic>
-        <p:nvPicPr>
           <p:cNvPr id="1028" name="Picture 4" descr="Kudu ZipDeploy - Visual Studio Marketplace">
             <a:extLst>
               <a:ext uri="{FF2B5EF4-FFF2-40B4-BE49-F238E27FC236}">
@@ -5665,7 +5630,7 @@
           <p:nvPr/>
         </p:nvPicPr>
         <p:blipFill>
-          <a:blip r:embed="rId15">
+          <a:blip r:embed="rId14">
             <a:clrChange>
               <a:clrFrom>
                 <a:srgbClr val="FFFFFF"/>
@@ -5766,7 +5731,7 @@
           <p:nvPr/>
         </p:nvPicPr>
         <p:blipFill>
-          <a:blip r:embed="rId14">
+          <a:blip r:embed="rId15">
             <a:extLst>
               <a:ext uri="{28A0092B-C50C-407E-A947-70E740481C1C}">
                 <a14:useLocalDpi xmlns:a14="http://schemas.microsoft.com/office/drawing/2010/main" val="0"/>
@@ -6282,10 +6247,10 @@
       </p:grpSpPr>
       <p:pic>
         <p:nvPicPr>
-          <p:cNvPr id="3" name="図 2" descr="グラフィカル ユーザー インターフェイス, アプリケーション&#10;&#10;自動的に生成された説明">
-            <a:extLst>
-              <a:ext uri="{FF2B5EF4-FFF2-40B4-BE49-F238E27FC236}">
-                <a16:creationId xmlns:a16="http://schemas.microsoft.com/office/drawing/2014/main" id="{6B1078E1-96FE-F339-2AB7-F337B93A78E0}"/>
+          <p:cNvPr id="2" name="図 1">
+            <a:extLst>
+              <a:ext uri="{FF2B5EF4-FFF2-40B4-BE49-F238E27FC236}">
+                <a16:creationId xmlns:a16="http://schemas.microsoft.com/office/drawing/2014/main" id="{55744A2A-E965-4DD3-625A-CF4085A55B58}"/>
               </a:ext>
             </a:extLst>
           </p:cNvPr>
@@ -6294,42 +6259,171 @@
           </p:cNvPicPr>
           <p:nvPr/>
         </p:nvPicPr>
-        <p:blipFill>
-          <a:blip r:embed="rId2">
-            <a:extLst>
-              <a:ext uri="{28A0092B-C50C-407E-A947-70E740481C1C}">
-                <a14:useLocalDpi xmlns:a14="http://schemas.microsoft.com/office/drawing/2010/main" val="0"/>
-              </a:ext>
-            </a:extLst>
-          </a:blip>
-          <a:stretch>
-            <a:fillRect/>
-          </a:stretch>
+        <p:blipFill rotWithShape="1">
+          <a:blip r:embed="rId2"/>
+          <a:srcRect t="17121"/>
+          <a:stretch/>
         </p:blipFill>
         <p:spPr>
           <a:xfrm>
-            <a:off x="2225476" y="1003175"/>
-            <a:ext cx="7741048" cy="4851649"/>
+            <a:off x="1057984" y="1811866"/>
+            <a:ext cx="10076033" cy="4076353"/>
           </a:xfrm>
           <a:prstGeom prst="rect">
             <a:avLst/>
           </a:prstGeom>
-          <a:ln>
-            <a:noFill/>
-          </a:ln>
-          <a:effectLst>
-            <a:outerShdw blurRad="292100" dist="139700" dir="2700000" algn="tl" rotWithShape="0">
-              <a:srgbClr val="333333">
-                <a:alpha val="65000"/>
-              </a:srgbClr>
-            </a:outerShdw>
-          </a:effectLst>
         </p:spPr>
       </p:pic>
+      <p:sp>
+        <p:nvSpPr>
+          <p:cNvPr id="3" name="吹き出し: 角を丸めた四角形 2">
+            <a:extLst>
+              <a:ext uri="{FF2B5EF4-FFF2-40B4-BE49-F238E27FC236}">
+                <a16:creationId xmlns:a16="http://schemas.microsoft.com/office/drawing/2014/main" id="{13BE36BF-5918-2CF6-5218-FB53BF80F3E6}"/>
+              </a:ext>
+            </a:extLst>
+          </p:cNvPr>
+          <p:cNvSpPr/>
+          <p:nvPr/>
+        </p:nvSpPr>
+        <p:spPr>
+          <a:xfrm>
+            <a:off x="4369605" y="3606799"/>
+            <a:ext cx="5214661" cy="2370666"/>
+          </a:xfrm>
+          <a:prstGeom prst="wedgeRoundRectCallout">
+            <a:avLst>
+              <a:gd name="adj1" fmla="val -72228"/>
+              <a:gd name="adj2" fmla="val -53929"/>
+              <a:gd name="adj3" fmla="val 16667"/>
+            </a:avLst>
+          </a:prstGeom>
+          <a:solidFill>
+            <a:srgbClr val="ED7D31">
+              <a:alpha val="63922"/>
+            </a:srgbClr>
+          </a:solidFill>
+        </p:spPr>
+        <p:style>
+          <a:lnRef idx="1">
+            <a:schemeClr val="accent2"/>
+          </a:lnRef>
+          <a:fillRef idx="2">
+            <a:schemeClr val="accent2"/>
+          </a:fillRef>
+          <a:effectRef idx="1">
+            <a:schemeClr val="accent2"/>
+          </a:effectRef>
+          <a:fontRef idx="minor">
+            <a:schemeClr val="dk1"/>
+          </a:fontRef>
+        </p:style>
+        <p:txBody>
+          <a:bodyPr rtlCol="0" anchor="t"/>
+          <a:lstStyle/>
+          <a:p>
+            <a:pPr algn="ctr"/>
+            <a:endParaRPr kumimoji="1" lang="en-US" altLang="ja-JP" dirty="0"/>
+          </a:p>
+          <a:p>
+            <a:r>
+              <a:rPr lang="en-US" altLang="ja-JP" dirty="0"/>
+              <a:t>PUT /</a:t>
+            </a:r>
+            <a:r>
+              <a:rPr lang="en-US" altLang="ja-JP" dirty="0" err="1"/>
+              <a:t>api</a:t>
+            </a:r>
+            <a:r>
+              <a:rPr lang="en-US" altLang="ja-JP" dirty="0"/>
+              <a:t>/</a:t>
+            </a:r>
+            <a:r>
+              <a:rPr lang="en-US" altLang="ja-JP" dirty="0" err="1"/>
+              <a:t>zipdeploy</a:t>
+            </a:r>
+            <a:r>
+              <a:rPr lang="en-US" altLang="ja-JP" dirty="0"/>
+              <a:t> HTTP/1.1</a:t>
+            </a:r>
+          </a:p>
+          <a:p>
+            <a:r>
+              <a:rPr kumimoji="1" lang="en-US" altLang="ja-JP" dirty="0"/>
+              <a:t>Host: hoge.sc</a:t>
+            </a:r>
+            <a:r>
+              <a:rPr lang="en-US" altLang="ja-JP" dirty="0"/>
+              <a:t>m.azurewebsite.net</a:t>
+            </a:r>
+          </a:p>
+          <a:p>
+            <a:r>
+              <a:rPr kumimoji="1" lang="en-US" altLang="ja-JP" b="1" dirty="0">
+                <a:solidFill>
+                  <a:srgbClr val="FF0000"/>
+                </a:solidFill>
+              </a:rPr>
+              <a:t>Authorization: Basic </a:t>
+            </a:r>
+            <a:r>
+              <a:rPr kumimoji="1" lang="en-US" altLang="ja-JP" b="1" dirty="0" err="1">
+                <a:solidFill>
+                  <a:srgbClr val="FF0000"/>
+                </a:solidFill>
+              </a:rPr>
+              <a:t>username:password</a:t>
+            </a:r>
+            <a:endParaRPr kumimoji="1" lang="en-US" altLang="ja-JP" b="1" dirty="0">
+              <a:solidFill>
+                <a:srgbClr val="FF0000"/>
+              </a:solidFill>
+            </a:endParaRPr>
+          </a:p>
+          <a:p>
+            <a:endParaRPr lang="en-US" altLang="ja-JP" b="1" dirty="0">
+              <a:solidFill>
+                <a:schemeClr val="tx1"/>
+              </a:solidFill>
+            </a:endParaRPr>
+          </a:p>
+          <a:p>
+            <a:r>
+              <a:rPr lang="ja-JP" altLang="en-US">
+                <a:solidFill>
+                  <a:schemeClr val="tx1"/>
+                </a:solidFill>
+              </a:rPr>
+              <a:t>・・・ </a:t>
+            </a:r>
+            <a:r>
+              <a:rPr lang="en-US" altLang="ja-JP">
+                <a:solidFill>
+                  <a:schemeClr val="tx1"/>
+                </a:solidFill>
+              </a:rPr>
+              <a:t>ZIP </a:t>
+            </a:r>
+            <a:r>
+              <a:rPr lang="ja-JP" altLang="en-US" dirty="0">
+                <a:solidFill>
+                  <a:schemeClr val="tx1"/>
+                </a:solidFill>
+              </a:rPr>
+              <a:t>ファイルのデータ・・・</a:t>
+            </a:r>
+            <a:endParaRPr kumimoji="1" lang="ja-JP" altLang="en-US" dirty="0">
+              <a:solidFill>
+                <a:schemeClr val="tx1"/>
+              </a:solidFill>
+            </a:endParaRPr>
+          </a:p>
+        </p:txBody>
+      </p:sp>
     </p:spTree>
     <p:extLst>
       <p:ext uri="{BB962C8B-B14F-4D97-AF65-F5344CB8AC3E}">
-        <p14:creationId xmlns:p14="http://schemas.microsoft.com/office/powerpoint/2010/main" val="1504511392"/>
+        <p14:creationId xmlns:p14="http://schemas.microsoft.com/office/powerpoint/2010/main" val="3406805856"/>
       </p:ext>
     </p:extLst>
   </p:cSld>
@@ -6358,6 +6452,82 @@
       </p:grpSpPr>
       <p:pic>
         <p:nvPicPr>
+          <p:cNvPr id="3" name="図 2" descr="グラフィカル ユーザー インターフェイス, アプリケーション&#10;&#10;自動的に生成された説明">
+            <a:extLst>
+              <a:ext uri="{FF2B5EF4-FFF2-40B4-BE49-F238E27FC236}">
+                <a16:creationId xmlns:a16="http://schemas.microsoft.com/office/drawing/2014/main" id="{6B1078E1-96FE-F339-2AB7-F337B93A78E0}"/>
+              </a:ext>
+            </a:extLst>
+          </p:cNvPr>
+          <p:cNvPicPr>
+            <a:picLocks noChangeAspect="1"/>
+          </p:cNvPicPr>
+          <p:nvPr/>
+        </p:nvPicPr>
+        <p:blipFill>
+          <a:blip r:embed="rId2">
+            <a:extLst>
+              <a:ext uri="{28A0092B-C50C-407E-A947-70E740481C1C}">
+                <a14:useLocalDpi xmlns:a14="http://schemas.microsoft.com/office/drawing/2010/main" val="0"/>
+              </a:ext>
+            </a:extLst>
+          </a:blip>
+          <a:stretch>
+            <a:fillRect/>
+          </a:stretch>
+        </p:blipFill>
+        <p:spPr>
+          <a:xfrm>
+            <a:off x="2225476" y="1003175"/>
+            <a:ext cx="7741048" cy="4851649"/>
+          </a:xfrm>
+          <a:prstGeom prst="rect">
+            <a:avLst/>
+          </a:prstGeom>
+          <a:ln>
+            <a:noFill/>
+          </a:ln>
+          <a:effectLst>
+            <a:outerShdw blurRad="292100" dist="139700" dir="2700000" algn="tl" rotWithShape="0">
+              <a:srgbClr val="333333">
+                <a:alpha val="65000"/>
+              </a:srgbClr>
+            </a:outerShdw>
+          </a:effectLst>
+        </p:spPr>
+      </p:pic>
+    </p:spTree>
+    <p:extLst>
+      <p:ext uri="{BB962C8B-B14F-4D97-AF65-F5344CB8AC3E}">
+        <p14:creationId xmlns:p14="http://schemas.microsoft.com/office/powerpoint/2010/main" val="1504511392"/>
+      </p:ext>
+    </p:extLst>
+  </p:cSld>
+  <p:clrMapOvr>
+    <a:masterClrMapping/>
+  </p:clrMapOvr>
+</p:sld>
+</file>
+
+<file path=ppt/slides/slide5.xml><?xml version="1.0" encoding="utf-8"?>
+<p:sld xmlns:a="http://schemas.openxmlformats.org/drawingml/2006/main" xmlns:r="http://schemas.openxmlformats.org/officeDocument/2006/relationships" xmlns:p="http://schemas.openxmlformats.org/presentationml/2006/main">
+  <p:cSld>
+    <p:spTree>
+      <p:nvGrpSpPr>
+        <p:cNvPr id="1" name=""/>
+        <p:cNvGrpSpPr/>
+        <p:nvPr/>
+      </p:nvGrpSpPr>
+      <p:grpSpPr>
+        <a:xfrm>
+          <a:off x="0" y="0"/>
+          <a:ext cx="0" cy="0"/>
+          <a:chOff x="0" y="0"/>
+          <a:chExt cx="0" cy="0"/>
+        </a:xfrm>
+      </p:grpSpPr>
+      <p:pic>
+        <p:nvPicPr>
           <p:cNvPr id="5" name="図 4">
             <a:extLst>
               <a:ext uri="{FF2B5EF4-FFF2-40B4-BE49-F238E27FC236}">
@@ -6501,7 +6671,7 @@
 </p:sld>
 </file>
 
-<file path=ppt/slides/slide5.xml><?xml version="1.0" encoding="utf-8"?>
+<file path=ppt/slides/slide6.xml><?xml version="1.0" encoding="utf-8"?>
 <p:sld xmlns:a="http://schemas.openxmlformats.org/drawingml/2006/main" xmlns:r="http://schemas.openxmlformats.org/officeDocument/2006/relationships" xmlns:p="http://schemas.openxmlformats.org/presentationml/2006/main">
   <p:cSld>
     <p:spTree>

</xml_diff>